<commit_message>
update interploation report and pres
</commit_message>
<xml_diff>
--- a/st-interp/clock-interpolation-pres-jan26.pptx
+++ b/st-interp/clock-interpolation-pres-jan26.pptx
@@ -10,8 +10,8 @@
   <p:sldIdLst>
     <p:sldId id="258" r:id="rId5"/>
     <p:sldId id="259" r:id="rId6"/>
-    <p:sldId id="260" r:id="rId7"/>
-    <p:sldId id="261" r:id="rId8"/>
+    <p:sldId id="261" r:id="rId7"/>
+    <p:sldId id="260" r:id="rId8"/>
     <p:sldId id="262" r:id="rId9"/>
     <p:sldId id="263" r:id="rId10"/>
     <p:sldId id="264" r:id="rId11"/>
@@ -222,7 +222,7 @@
           <a:p>
             <a:fld id="{228CF6E1-0A4A-D745-ABA3-2094B2ECBFF0}" type="datetimeFigureOut">
               <a:rPr lang="en-US" smtClean="0"/>
-              <a:t>12/30/25</a:t>
+              <a:t>1/5/26</a:t>
             </a:fld>
             <a:endParaRPr lang="en-US"/>
           </a:p>
@@ -989,7 +989,7 @@
         <p:cNvPr id="1" name="">
           <a:extLst>
             <a:ext uri="{FF2B5EF4-FFF2-40B4-BE49-F238E27FC236}">
-              <a16:creationId xmlns:a16="http://schemas.microsoft.com/office/drawing/2014/main" id="{6B65D989-2F69-6335-7578-11D222159BD7}"/>
+              <a16:creationId xmlns:a16="http://schemas.microsoft.com/office/drawing/2014/main" id="{16EBD0B5-ECC8-B855-C4EE-A42D4099D0DF}"/>
             </a:ext>
           </a:extLst>
         </p:cNvPr>
@@ -1009,7 +1009,7 @@
           <p:cNvPr id="2" name="Slide Image Placeholder 1">
             <a:extLst>
               <a:ext uri="{FF2B5EF4-FFF2-40B4-BE49-F238E27FC236}">
-                <a16:creationId xmlns:a16="http://schemas.microsoft.com/office/drawing/2014/main" id="{D8BA4F33-0C4C-CD7F-BB6F-A3F494B492B9}"/>
+                <a16:creationId xmlns:a16="http://schemas.microsoft.com/office/drawing/2014/main" id="{C5BD8F85-1875-457D-B944-C38D5470018C}"/>
               </a:ext>
             </a:extLst>
           </p:cNvPr>
@@ -1027,7 +1027,7 @@
           <p:cNvPr id="3" name="Notes Placeholder 2">
             <a:extLst>
               <a:ext uri="{FF2B5EF4-FFF2-40B4-BE49-F238E27FC236}">
-                <a16:creationId xmlns:a16="http://schemas.microsoft.com/office/drawing/2014/main" id="{D63237CB-8026-FD72-3159-203D2ACB14E4}"/>
+                <a16:creationId xmlns:a16="http://schemas.microsoft.com/office/drawing/2014/main" id="{661802A6-2B17-ECB3-3FD2-6A279E4ECD43}"/>
               </a:ext>
             </a:extLst>
           </p:cNvPr>
@@ -1052,7 +1052,7 @@
           <p:cNvPr id="4" name="Slide Number Placeholder 3">
             <a:extLst>
               <a:ext uri="{FF2B5EF4-FFF2-40B4-BE49-F238E27FC236}">
-                <a16:creationId xmlns:a16="http://schemas.microsoft.com/office/drawing/2014/main" id="{70373B45-C398-B3BE-58D0-31942C5BA72B}"/>
+                <a16:creationId xmlns:a16="http://schemas.microsoft.com/office/drawing/2014/main" id="{E2A90C7D-5F3E-B204-2629-3F196EB88022}"/>
               </a:ext>
             </a:extLst>
           </p:cNvPr>
@@ -1079,7 +1079,7 @@
     </p:spTree>
     <p:extLst>
       <p:ext uri="{BB962C8B-B14F-4D97-AF65-F5344CB8AC3E}">
-        <p14:creationId xmlns:p14="http://schemas.microsoft.com/office/powerpoint/2010/main" val="190905902"/>
+        <p14:creationId xmlns:p14="http://schemas.microsoft.com/office/powerpoint/2010/main" val="3576417657"/>
       </p:ext>
     </p:extLst>
   </p:cSld>
@@ -1097,7 +1097,7 @@
         <p:cNvPr id="1" name="">
           <a:extLst>
             <a:ext uri="{FF2B5EF4-FFF2-40B4-BE49-F238E27FC236}">
-              <a16:creationId xmlns:a16="http://schemas.microsoft.com/office/drawing/2014/main" id="{16EBD0B5-ECC8-B855-C4EE-A42D4099D0DF}"/>
+              <a16:creationId xmlns:a16="http://schemas.microsoft.com/office/drawing/2014/main" id="{6B65D989-2F69-6335-7578-11D222159BD7}"/>
             </a:ext>
           </a:extLst>
         </p:cNvPr>
@@ -1117,7 +1117,7 @@
           <p:cNvPr id="2" name="Slide Image Placeholder 1">
             <a:extLst>
               <a:ext uri="{FF2B5EF4-FFF2-40B4-BE49-F238E27FC236}">
-                <a16:creationId xmlns:a16="http://schemas.microsoft.com/office/drawing/2014/main" id="{C5BD8F85-1875-457D-B944-C38D5470018C}"/>
+                <a16:creationId xmlns:a16="http://schemas.microsoft.com/office/drawing/2014/main" id="{D8BA4F33-0C4C-CD7F-BB6F-A3F494B492B9}"/>
               </a:ext>
             </a:extLst>
           </p:cNvPr>
@@ -1135,7 +1135,7 @@
           <p:cNvPr id="3" name="Notes Placeholder 2">
             <a:extLst>
               <a:ext uri="{FF2B5EF4-FFF2-40B4-BE49-F238E27FC236}">
-                <a16:creationId xmlns:a16="http://schemas.microsoft.com/office/drawing/2014/main" id="{661802A6-2B17-ECB3-3FD2-6A279E4ECD43}"/>
+                <a16:creationId xmlns:a16="http://schemas.microsoft.com/office/drawing/2014/main" id="{D63237CB-8026-FD72-3159-203D2ACB14E4}"/>
               </a:ext>
             </a:extLst>
           </p:cNvPr>
@@ -1160,7 +1160,7 @@
           <p:cNvPr id="4" name="Slide Number Placeholder 3">
             <a:extLst>
               <a:ext uri="{FF2B5EF4-FFF2-40B4-BE49-F238E27FC236}">
-                <a16:creationId xmlns:a16="http://schemas.microsoft.com/office/drawing/2014/main" id="{E2A90C7D-5F3E-B204-2629-3F196EB88022}"/>
+                <a16:creationId xmlns:a16="http://schemas.microsoft.com/office/drawing/2014/main" id="{70373B45-C398-B3BE-58D0-31942C5BA72B}"/>
               </a:ext>
             </a:extLst>
           </p:cNvPr>
@@ -1187,7 +1187,7 @@
     </p:spTree>
     <p:extLst>
       <p:ext uri="{BB962C8B-B14F-4D97-AF65-F5344CB8AC3E}">
-        <p14:creationId xmlns:p14="http://schemas.microsoft.com/office/powerpoint/2010/main" val="3576417657"/>
+        <p14:creationId xmlns:p14="http://schemas.microsoft.com/office/powerpoint/2010/main" val="190905902"/>
       </p:ext>
     </p:extLst>
   </p:cSld>
@@ -1901,7 +1901,7 @@
           <a:p>
             <a:fld id="{EF1F6868-B405-CA44-B412-5D6C4F518A0C}" type="datetimeFigureOut">
               <a:rPr lang="en-US" smtClean="0"/>
-              <a:t>12/30/25</a:t>
+              <a:t>1/5/26</a:t>
             </a:fld>
             <a:endParaRPr lang="en-US"/>
           </a:p>
@@ -2385,7 +2385,7 @@
           <a:p>
             <a:fld id="{EF1F6868-B405-CA44-B412-5D6C4F518A0C}" type="datetimeFigureOut">
               <a:rPr lang="en-US" smtClean="0"/>
-              <a:t>12/30/25</a:t>
+              <a:t>1/5/26</a:t>
             </a:fld>
             <a:endParaRPr lang="en-US"/>
           </a:p>
@@ -2526,7 +2526,7 @@
           <a:p>
             <a:fld id="{EF1F6868-B405-CA44-B412-5D6C4F518A0C}" type="datetimeFigureOut">
               <a:rPr lang="en-US" smtClean="0"/>
-              <a:t>12/30/25</a:t>
+              <a:t>1/5/26</a:t>
             </a:fld>
             <a:endParaRPr lang="en-US"/>
           </a:p>
@@ -2639,7 +2639,7 @@
           <a:p>
             <a:fld id="{EF1F6868-B405-CA44-B412-5D6C4F518A0C}" type="datetimeFigureOut">
               <a:rPr lang="en-US" smtClean="0"/>
-              <a:t>12/30/25</a:t>
+              <a:t>1/5/26</a:t>
             </a:fld>
             <a:endParaRPr lang="en-US"/>
           </a:p>
@@ -2950,7 +2950,7 @@
           <a:p>
             <a:fld id="{EF1F6868-B405-CA44-B412-5D6C4F518A0C}" type="datetimeFigureOut">
               <a:rPr lang="en-US" smtClean="0"/>
-              <a:t>12/30/25</a:t>
+              <a:t>1/5/26</a:t>
             </a:fld>
             <a:endParaRPr lang="en-US"/>
           </a:p>
@@ -3238,7 +3238,7 @@
           <a:p>
             <a:fld id="{EF1F6868-B405-CA44-B412-5D6C4F518A0C}" type="datetimeFigureOut">
               <a:rPr lang="en-US" smtClean="0"/>
-              <a:t>12/30/25</a:t>
+              <a:t>1/5/26</a:t>
             </a:fld>
             <a:endParaRPr lang="en-US"/>
           </a:p>
@@ -3436,7 +3436,7 @@
           <a:p>
             <a:fld id="{EF1F6868-B405-CA44-B412-5D6C4F518A0C}" type="datetimeFigureOut">
               <a:rPr lang="en-US" smtClean="0"/>
-              <a:t>12/30/25</a:t>
+              <a:t>1/5/26</a:t>
             </a:fld>
             <a:endParaRPr lang="en-US"/>
           </a:p>
@@ -3644,7 +3644,7 @@
           <a:p>
             <a:fld id="{EF1F6868-B405-CA44-B412-5D6C4F518A0C}" type="datetimeFigureOut">
               <a:rPr lang="en-US" smtClean="0"/>
-              <a:t>12/30/25</a:t>
+              <a:t>1/5/26</a:t>
             </a:fld>
             <a:endParaRPr lang="en-US"/>
           </a:p>
@@ -4295,7 +4295,7 @@
           <a:p>
             <a:fld id="{5667F5AF-E0DF-6E43-A1D7-F5FEFFC73166}" type="datetimeFigureOut">
               <a:rPr lang="en-US" smtClean="0"/>
-              <a:t>12/30/25</a:t>
+              <a:t>1/5/26</a:t>
             </a:fld>
             <a:endParaRPr lang="en-US"/>
           </a:p>
@@ -4651,7 +4651,7 @@
           <a:p>
             <a:fld id="{5667F5AF-E0DF-6E43-A1D7-F5FEFFC73166}" type="datetimeFigureOut">
               <a:rPr lang="en-US" smtClean="0"/>
-              <a:t>12/30/25</a:t>
+              <a:t>1/5/26</a:t>
             </a:fld>
             <a:endParaRPr lang="en-US"/>
           </a:p>
@@ -4836,7 +4836,7 @@
           <a:p>
             <a:fld id="{EF1F6868-B405-CA44-B412-5D6C4F518A0C}" type="datetimeFigureOut">
               <a:rPr lang="en-US" smtClean="0"/>
-              <a:t>12/30/25</a:t>
+              <a:t>1/5/26</a:t>
             </a:fld>
             <a:endParaRPr lang="en-US"/>
           </a:p>
@@ -5342,7 +5342,7 @@
           <a:p>
             <a:fld id="{EF1F6868-B405-CA44-B412-5D6C4F518A0C}" type="datetimeFigureOut">
               <a:rPr lang="en-US" smtClean="0"/>
-              <a:t>12/30/25</a:t>
+              <a:t>1/5/26</a:t>
             </a:fld>
             <a:endParaRPr lang="en-US"/>
           </a:p>
@@ -5755,7 +5755,7 @@
           <a:p>
             <a:fld id="{EF1F6868-B405-CA44-B412-5D6C4F518A0C}" type="datetimeFigureOut">
               <a:rPr lang="en-US" smtClean="0"/>
-              <a:t>12/30/25</a:t>
+              <a:t>1/5/26</a:t>
             </a:fld>
             <a:endParaRPr lang="en-US"/>
           </a:p>
@@ -6089,7 +6089,7 @@
           <a:p>
             <a:fld id="{EF1F6868-B405-CA44-B412-5D6C4F518A0C}" type="datetimeFigureOut">
               <a:rPr lang="en-US" smtClean="0"/>
-              <a:t>12/30/25</a:t>
+              <a:t>1/5/26</a:t>
             </a:fld>
             <a:endParaRPr lang="en-US"/>
           </a:p>
@@ -6701,7 +6701,7 @@
           <a:p>
             <a:fld id="{EF1F6868-B405-CA44-B412-5D6C4F518A0C}" type="datetimeFigureOut">
               <a:rPr lang="en-US" smtClean="0"/>
-              <a:t>12/30/25</a:t>
+              <a:t>1/5/26</a:t>
             </a:fld>
             <a:endParaRPr lang="en-US"/>
           </a:p>
@@ -6976,7 +6976,7 @@
           <a:p>
             <a:fld id="{EF1F6868-B405-CA44-B412-5D6C4F518A0C}" type="datetimeFigureOut">
               <a:rPr lang="en-US" smtClean="0"/>
-              <a:t>12/30/25</a:t>
+              <a:t>1/5/26</a:t>
             </a:fld>
             <a:endParaRPr lang="en-US"/>
           </a:p>
@@ -7217,7 +7217,7 @@
           <a:p>
             <a:fld id="{EF1F6868-B405-CA44-B412-5D6C4F518A0C}" type="datetimeFigureOut">
               <a:rPr lang="en-US" smtClean="0"/>
-              <a:t>12/30/25</a:t>
+              <a:t>1/5/26</a:t>
             </a:fld>
             <a:endParaRPr lang="en-US"/>
           </a:p>
@@ -8594,7 +8594,7 @@
         <p:cNvPr id="1" name="">
           <a:extLst>
             <a:ext uri="{FF2B5EF4-FFF2-40B4-BE49-F238E27FC236}">
-              <a16:creationId xmlns:a16="http://schemas.microsoft.com/office/drawing/2014/main" id="{4990CB37-FE16-F09F-A4E0-D43E90198DB7}"/>
+              <a16:creationId xmlns:a16="http://schemas.microsoft.com/office/drawing/2014/main" id="{A6EE26C8-8DEB-8081-D705-48397C8860BF}"/>
             </a:ext>
           </a:extLst>
         </p:cNvPr>
@@ -8614,7 +8614,7 @@
           <p:cNvPr id="10" name="TextBox 9">
             <a:extLst>
               <a:ext uri="{FF2B5EF4-FFF2-40B4-BE49-F238E27FC236}">
-                <a16:creationId xmlns:a16="http://schemas.microsoft.com/office/drawing/2014/main" id="{91CD9778-4806-C801-384A-968F11B40208}"/>
+                <a16:creationId xmlns:a16="http://schemas.microsoft.com/office/drawing/2014/main" id="{8B8F9B9E-03F4-60B2-42B9-91C52236C7D4}"/>
               </a:ext>
             </a:extLst>
           </p:cNvPr>
@@ -8656,7 +8656,7 @@
           <p:cNvPr id="12" name="TextBox 11">
             <a:extLst>
               <a:ext uri="{FF2B5EF4-FFF2-40B4-BE49-F238E27FC236}">
-                <a16:creationId xmlns:a16="http://schemas.microsoft.com/office/drawing/2014/main" id="{C9E70B45-EECF-D681-87FF-1EE9704BB33B}"/>
+                <a16:creationId xmlns:a16="http://schemas.microsoft.com/office/drawing/2014/main" id="{E6A51A8F-9E2B-68AB-D1F0-00EA7D22AC93}"/>
               </a:ext>
             </a:extLst>
           </p:cNvPr>
@@ -8695,24 +8695,24 @@
       </p:sp>
       <p:sp>
         <p:nvSpPr>
-          <p:cNvPr id="2" name="Title 1">
-            <a:extLst>
-              <a:ext uri="{FF2B5EF4-FFF2-40B4-BE49-F238E27FC236}">
-                <a16:creationId xmlns:a16="http://schemas.microsoft.com/office/drawing/2014/main" id="{B8573AB8-B651-37B4-CE08-85099A0179F3}"/>
-              </a:ext>
-            </a:extLst>
-          </p:cNvPr>
-          <p:cNvSpPr>
-            <a:spLocks noGrp="1"/>
-          </p:cNvSpPr>
-          <p:nvPr>
-            <p:ph type="title"/>
-          </p:nvPr>
-        </p:nvSpPr>
-        <p:spPr>
-          <a:xfrm>
-            <a:off x="574040" y="0"/>
-            <a:ext cx="10515600" cy="1325563"/>
+          <p:cNvPr id="6" name="Text Placeholder 5">
+            <a:extLst>
+              <a:ext uri="{FF2B5EF4-FFF2-40B4-BE49-F238E27FC236}">
+                <a16:creationId xmlns:a16="http://schemas.microsoft.com/office/drawing/2014/main" id="{8A8D8BBA-EAC3-0192-9B11-DB13C6D6A4CB}"/>
+              </a:ext>
+            </a:extLst>
+          </p:cNvPr>
+          <p:cNvSpPr>
+            <a:spLocks noGrp="1"/>
+          </p:cNvSpPr>
+          <p:nvPr>
+            <p:ph type="body" sz="half" idx="2"/>
+          </p:nvPr>
+        </p:nvSpPr>
+        <p:spPr>
+          <a:xfrm>
+            <a:off x="697143" y="1458276"/>
+            <a:ext cx="10753493" cy="3459164"/>
           </a:xfrm>
         </p:spPr>
         <p:txBody>
@@ -8723,45 +8723,74 @@
           <a:p>
             <a:r>
               <a:rPr lang="en-US" dirty="0"/>
-              <a:t>Visualizing all shift data </a:t>
-            </a:r>
-          </a:p>
-        </p:txBody>
-      </p:sp>
-      <p:pic>
-        <p:nvPicPr>
-          <p:cNvPr id="3" name="Picture 2">
-            <a:extLst>
-              <a:ext uri="{FF2B5EF4-FFF2-40B4-BE49-F238E27FC236}">
-                <a16:creationId xmlns:a16="http://schemas.microsoft.com/office/drawing/2014/main" id="{333A4EEB-4992-267E-DFBC-223344B9E0F1}"/>
-              </a:ext>
-            </a:extLst>
-          </p:cNvPr>
-          <p:cNvPicPr>
-            <a:picLocks noChangeAspect="1"/>
-          </p:cNvPicPr>
-          <p:nvPr/>
-        </p:nvPicPr>
-        <p:blipFill>
-          <a:blip r:embed="rId3"/>
-          <a:stretch>
-            <a:fillRect/>
-          </a:stretch>
-        </p:blipFill>
-        <p:spPr>
-          <a:xfrm>
-            <a:off x="2775781" y="1687707"/>
-            <a:ext cx="5881370" cy="4387689"/>
-          </a:xfrm>
-          <a:prstGeom prst="rect">
-            <a:avLst/>
-          </a:prstGeom>
-        </p:spPr>
-      </p:pic>
+              <a:t>The following summaries represent how many shift data points were deemed “not good” based on the IS_GOOD indicator for each clock.</a:t>
+            </a:r>
+          </a:p>
+          <a:p>
+            <a:endParaRPr lang="en-US" dirty="0"/>
+          </a:p>
+          <a:p>
+            <a:r>
+              <a:rPr lang="en-US" dirty="0"/>
+              <a:t>NA Al shift values: 81164 </a:t>
+            </a:r>
+          </a:p>
+          <a:p>
+            <a:r>
+              <a:rPr lang="en-US" dirty="0"/>
+              <a:t>NA Sr shift values: 0 </a:t>
+            </a:r>
+          </a:p>
+          <a:p>
+            <a:r>
+              <a:rPr lang="en-US" dirty="0"/>
+              <a:t>NA Yb shift values: 515</a:t>
+            </a:r>
+            <a:endParaRPr lang="en-US" dirty="0">
+              <a:cs typeface="Arial" panose="020B0604020202020204" pitchFamily="34" charset="0"/>
+            </a:endParaRPr>
+          </a:p>
+        </p:txBody>
+      </p:sp>
+      <p:sp>
+        <p:nvSpPr>
+          <p:cNvPr id="2" name="Title 1">
+            <a:extLst>
+              <a:ext uri="{FF2B5EF4-FFF2-40B4-BE49-F238E27FC236}">
+                <a16:creationId xmlns:a16="http://schemas.microsoft.com/office/drawing/2014/main" id="{0461037F-E7DD-CC6B-0FD3-C2ABBC3256D6}"/>
+              </a:ext>
+            </a:extLst>
+          </p:cNvPr>
+          <p:cNvSpPr>
+            <a:spLocks noGrp="1"/>
+          </p:cNvSpPr>
+          <p:nvPr>
+            <p:ph type="title"/>
+          </p:nvPr>
+        </p:nvSpPr>
+        <p:spPr>
+          <a:xfrm>
+            <a:off x="574040" y="0"/>
+            <a:ext cx="10515600" cy="1325563"/>
+          </a:xfrm>
+        </p:spPr>
+        <p:txBody>
+          <a:bodyPr>
+            <a:normAutofit/>
+          </a:bodyPr>
+          <a:lstStyle/>
+          <a:p>
+            <a:r>
+              <a:rPr lang="en-US" dirty="0"/>
+              <a:t>Summary of “not good” shift data </a:t>
+            </a:r>
+          </a:p>
+        </p:txBody>
+      </p:sp>
     </p:spTree>
     <p:extLst>
       <p:ext uri="{BB962C8B-B14F-4D97-AF65-F5344CB8AC3E}">
-        <p14:creationId xmlns:p14="http://schemas.microsoft.com/office/powerpoint/2010/main" val="1501752340"/>
+        <p14:creationId xmlns:p14="http://schemas.microsoft.com/office/powerpoint/2010/main" val="543305570"/>
       </p:ext>
     </p:extLst>
   </p:cSld>
@@ -8779,7 +8808,7 @@
         <p:cNvPr id="1" name="">
           <a:extLst>
             <a:ext uri="{FF2B5EF4-FFF2-40B4-BE49-F238E27FC236}">
-              <a16:creationId xmlns:a16="http://schemas.microsoft.com/office/drawing/2014/main" id="{A6EE26C8-8DEB-8081-D705-48397C8860BF}"/>
+              <a16:creationId xmlns:a16="http://schemas.microsoft.com/office/drawing/2014/main" id="{4990CB37-FE16-F09F-A4E0-D43E90198DB7}"/>
             </a:ext>
           </a:extLst>
         </p:cNvPr>
@@ -8799,7 +8828,7 @@
           <p:cNvPr id="10" name="TextBox 9">
             <a:extLst>
               <a:ext uri="{FF2B5EF4-FFF2-40B4-BE49-F238E27FC236}">
-                <a16:creationId xmlns:a16="http://schemas.microsoft.com/office/drawing/2014/main" id="{8B8F9B9E-03F4-60B2-42B9-91C52236C7D4}"/>
+                <a16:creationId xmlns:a16="http://schemas.microsoft.com/office/drawing/2014/main" id="{91CD9778-4806-C801-384A-968F11B40208}"/>
               </a:ext>
             </a:extLst>
           </p:cNvPr>
@@ -8841,7 +8870,7 @@
           <p:cNvPr id="12" name="TextBox 11">
             <a:extLst>
               <a:ext uri="{FF2B5EF4-FFF2-40B4-BE49-F238E27FC236}">
-                <a16:creationId xmlns:a16="http://schemas.microsoft.com/office/drawing/2014/main" id="{E6A51A8F-9E2B-68AB-D1F0-00EA7D22AC93}"/>
+                <a16:creationId xmlns:a16="http://schemas.microsoft.com/office/drawing/2014/main" id="{C9E70B45-EECF-D681-87FF-1EE9704BB33B}"/>
               </a:ext>
             </a:extLst>
           </p:cNvPr>
@@ -8880,24 +8909,24 @@
       </p:sp>
       <p:sp>
         <p:nvSpPr>
-          <p:cNvPr id="6" name="Text Placeholder 5">
-            <a:extLst>
-              <a:ext uri="{FF2B5EF4-FFF2-40B4-BE49-F238E27FC236}">
-                <a16:creationId xmlns:a16="http://schemas.microsoft.com/office/drawing/2014/main" id="{8A8D8BBA-EAC3-0192-9B11-DB13C6D6A4CB}"/>
-              </a:ext>
-            </a:extLst>
-          </p:cNvPr>
-          <p:cNvSpPr>
-            <a:spLocks noGrp="1"/>
-          </p:cNvSpPr>
-          <p:nvPr>
-            <p:ph type="body" sz="half" idx="2"/>
-          </p:nvPr>
-        </p:nvSpPr>
-        <p:spPr>
-          <a:xfrm>
-            <a:off x="697143" y="1458276"/>
-            <a:ext cx="10753493" cy="3459164"/>
+          <p:cNvPr id="2" name="Title 1">
+            <a:extLst>
+              <a:ext uri="{FF2B5EF4-FFF2-40B4-BE49-F238E27FC236}">
+                <a16:creationId xmlns:a16="http://schemas.microsoft.com/office/drawing/2014/main" id="{B8573AB8-B651-37B4-CE08-85099A0179F3}"/>
+              </a:ext>
+            </a:extLst>
+          </p:cNvPr>
+          <p:cNvSpPr>
+            <a:spLocks noGrp="1"/>
+          </p:cNvSpPr>
+          <p:nvPr>
+            <p:ph type="title"/>
+          </p:nvPr>
+        </p:nvSpPr>
+        <p:spPr>
+          <a:xfrm>
+            <a:off x="574040" y="0"/>
+            <a:ext cx="10515600" cy="1325563"/>
           </a:xfrm>
         </p:spPr>
         <p:txBody>
@@ -8908,74 +8937,45 @@
           <a:p>
             <a:r>
               <a:rPr lang="en-US" dirty="0"/>
-              <a:t>The following summaries represent how many shift data points were deemed “not good” based on the IS_GOOD indicator for each clock.</a:t>
-            </a:r>
-          </a:p>
-          <a:p>
-            <a:endParaRPr lang="en-US" dirty="0"/>
-          </a:p>
-          <a:p>
-            <a:r>
-              <a:rPr lang="en-US" dirty="0"/>
-              <a:t>NA Al shift values: 81164 </a:t>
-            </a:r>
-          </a:p>
-          <a:p>
-            <a:r>
-              <a:rPr lang="en-US" dirty="0"/>
-              <a:t>NA Sr shift values: 0 </a:t>
-            </a:r>
-          </a:p>
-          <a:p>
-            <a:r>
-              <a:rPr lang="en-US" dirty="0"/>
-              <a:t>NA Yb shift values: 515</a:t>
-            </a:r>
-            <a:endParaRPr lang="en-US" dirty="0">
-              <a:cs typeface="Arial" panose="020B0604020202020204" pitchFamily="34" charset="0"/>
-            </a:endParaRPr>
-          </a:p>
-        </p:txBody>
-      </p:sp>
-      <p:sp>
-        <p:nvSpPr>
-          <p:cNvPr id="2" name="Title 1">
-            <a:extLst>
-              <a:ext uri="{FF2B5EF4-FFF2-40B4-BE49-F238E27FC236}">
-                <a16:creationId xmlns:a16="http://schemas.microsoft.com/office/drawing/2014/main" id="{0461037F-E7DD-CC6B-0FD3-C2ABBC3256D6}"/>
-              </a:ext>
-            </a:extLst>
-          </p:cNvPr>
-          <p:cNvSpPr>
-            <a:spLocks noGrp="1"/>
-          </p:cNvSpPr>
-          <p:nvPr>
-            <p:ph type="title"/>
-          </p:nvPr>
-        </p:nvSpPr>
-        <p:spPr>
-          <a:xfrm>
-            <a:off x="574040" y="0"/>
-            <a:ext cx="10515600" cy="1325563"/>
-          </a:xfrm>
-        </p:spPr>
-        <p:txBody>
-          <a:bodyPr>
-            <a:normAutofit/>
-          </a:bodyPr>
-          <a:lstStyle/>
-          <a:p>
-            <a:r>
-              <a:rPr lang="en-US" dirty="0"/>
-              <a:t>Summary of “not good” shift data </a:t>
-            </a:r>
-          </a:p>
-        </p:txBody>
-      </p:sp>
+              <a:t>Visualizing all shift data </a:t>
+            </a:r>
+          </a:p>
+        </p:txBody>
+      </p:sp>
+      <p:pic>
+        <p:nvPicPr>
+          <p:cNvPr id="3" name="Picture 2">
+            <a:extLst>
+              <a:ext uri="{FF2B5EF4-FFF2-40B4-BE49-F238E27FC236}">
+                <a16:creationId xmlns:a16="http://schemas.microsoft.com/office/drawing/2014/main" id="{333A4EEB-4992-267E-DFBC-223344B9E0F1}"/>
+              </a:ext>
+            </a:extLst>
+          </p:cNvPr>
+          <p:cNvPicPr>
+            <a:picLocks noChangeAspect="1"/>
+          </p:cNvPicPr>
+          <p:nvPr/>
+        </p:nvPicPr>
+        <p:blipFill>
+          <a:blip r:embed="rId3"/>
+          <a:stretch>
+            <a:fillRect/>
+          </a:stretch>
+        </p:blipFill>
+        <p:spPr>
+          <a:xfrm>
+            <a:off x="2775781" y="1687707"/>
+            <a:ext cx="5881370" cy="4387689"/>
+          </a:xfrm>
+          <a:prstGeom prst="rect">
+            <a:avLst/>
+          </a:prstGeom>
+        </p:spPr>
+      </p:pic>
     </p:spTree>
     <p:extLst>
       <p:ext uri="{BB962C8B-B14F-4D97-AF65-F5344CB8AC3E}">
-        <p14:creationId xmlns:p14="http://schemas.microsoft.com/office/powerpoint/2010/main" val="543305570"/>
+        <p14:creationId xmlns:p14="http://schemas.microsoft.com/office/powerpoint/2010/main" val="1501752340"/>
       </p:ext>
     </p:extLst>
   </p:cSld>
@@ -9128,7 +9128,31 @@
           <a:p>
             <a:r>
               <a:rPr lang="en-US" dirty="0"/>
-              <a:t>Al good shift start and end MJD: [ 60752.9509491 , 60753.0115278 ] </a:t>
+              <a:t>Al good shift start and end MJD: [ </a:t>
+            </a:r>
+            <a:r>
+              <a:rPr lang="en-US" dirty="0">
+                <a:highlight>
+                  <a:srgbClr val="FFFF00"/>
+                </a:highlight>
+              </a:rPr>
+              <a:t>60752.9509491</a:t>
+            </a:r>
+            <a:r>
+              <a:rPr lang="en-US" dirty="0"/>
+              <a:t> , </a:t>
+            </a:r>
+            <a:r>
+              <a:rPr lang="en-US" dirty="0">
+                <a:highlight>
+                  <a:srgbClr val="FFFF00"/>
+                </a:highlight>
+              </a:rPr>
+              <a:t>60753.0115278</a:t>
+            </a:r>
+            <a:r>
+              <a:rPr lang="en-US" dirty="0"/>
+              <a:t> ] </a:t>
             </a:r>
           </a:p>
           <a:p>
@@ -9151,15 +9175,34 @@
           <a:p>
             <a:r>
               <a:rPr lang="en-US" dirty="0"/>
-              <a:t>Last start time: 60752.9509491 </a:t>
+              <a:t>Last start time: </a:t>
+            </a:r>
+            <a:r>
+              <a:rPr lang="en-US" dirty="0">
+                <a:highlight>
+                  <a:srgbClr val="FFFF00"/>
+                </a:highlight>
+              </a:rPr>
+              <a:t>60752.9509491 </a:t>
             </a:r>
           </a:p>
           <a:p>
             <a:r>
               <a:rPr lang="en-US" dirty="0"/>
-              <a:t>First end time: 60753.0115278</a:t>
+              <a:t>First end time: </a:t>
+            </a:r>
+            <a:r>
+              <a:rPr lang="en-US" dirty="0">
+                <a:highlight>
+                  <a:srgbClr val="FFFF00"/>
+                </a:highlight>
+              </a:rPr>
+              <a:t>60753.0115278</a:t>
             </a:r>
             <a:endParaRPr lang="en-US" dirty="0">
+              <a:highlight>
+                <a:srgbClr val="FFFF00"/>
+              </a:highlight>
               <a:cs typeface="Arial" panose="020B0604020202020204" pitchFamily="34" charset="0"/>
             </a:endParaRPr>
           </a:p>
@@ -9590,11 +9633,29 @@
           <a:p>
             <a:r>
               <a:rPr lang="en-US" dirty="0"/>
-              <a:t>Can see the need for interpolation in order to derive a ratio time series</a:t>
-            </a:r>
+              <a:t>Can see the need for interpolation due to misalignment in order to derive a ratio time series</a:t>
+            </a:r>
+          </a:p>
+          <a:p>
             <a:endParaRPr lang="en-US" dirty="0">
               <a:cs typeface="Arial" panose="020B0604020202020204" pitchFamily="34" charset="0"/>
             </a:endParaRPr>
+          </a:p>
+          <a:p>
+            <a:r>
+              <a:rPr lang="en-US" dirty="0">
+                <a:cs typeface="Arial" panose="020B0604020202020204" pitchFamily="34" charset="0"/>
+              </a:rPr>
+              <a:t>Clarify distinction between missing data and misaligned data. </a:t>
+            </a:r>
+          </a:p>
+          <a:p>
+            <a:r>
+              <a:rPr lang="en-US" dirty="0">
+                <a:cs typeface="Arial" panose="020B0604020202020204" pitchFamily="34" charset="0"/>
+              </a:rPr>
+              <a:t>Can incorporate an interpolation limit </a:t>
+            </a:r>
           </a:p>
         </p:txBody>
       </p:sp>
@@ -9753,26 +9814,297 @@
           </a:p>
         </p:txBody>
       </p:sp>
-      <p:sp>
-        <p:nvSpPr>
-          <p:cNvPr id="6" name="Text Placeholder 5">
-            <a:extLst>
-              <a:ext uri="{FF2B5EF4-FFF2-40B4-BE49-F238E27FC236}">
-                <a16:creationId xmlns:a16="http://schemas.microsoft.com/office/drawing/2014/main" id="{AB164033-6ED8-171F-DA06-1338A512F996}"/>
-              </a:ext>
-            </a:extLst>
-          </p:cNvPr>
-          <p:cNvSpPr>
-            <a:spLocks noGrp="1"/>
-          </p:cNvSpPr>
-          <p:nvPr>
-            <p:ph type="body" sz="half" idx="2"/>
-          </p:nvPr>
-        </p:nvSpPr>
-        <p:spPr>
-          <a:xfrm>
-            <a:off x="697143" y="1458276"/>
-            <a:ext cx="10753493" cy="3459164"/>
+      <mc:AlternateContent xmlns:mc="http://schemas.openxmlformats.org/markup-compatibility/2006">
+        <mc:Choice xmlns:a14="http://schemas.microsoft.com/office/drawing/2010/main" Requires="a14">
+          <p:sp>
+            <p:nvSpPr>
+              <p:cNvPr id="6" name="Text Placeholder 5">
+                <a:extLst>
+                  <a:ext uri="{FF2B5EF4-FFF2-40B4-BE49-F238E27FC236}">
+                    <a16:creationId xmlns:a16="http://schemas.microsoft.com/office/drawing/2014/main" id="{AB164033-6ED8-171F-DA06-1338A512F996}"/>
+                  </a:ext>
+                </a:extLst>
+              </p:cNvPr>
+              <p:cNvSpPr>
+                <a:spLocks noGrp="1"/>
+              </p:cNvSpPr>
+              <p:nvPr>
+                <p:ph type="body" sz="half" idx="2"/>
+              </p:nvPr>
+            </p:nvSpPr>
+            <p:spPr>
+              <a:xfrm>
+                <a:off x="336147" y="1389217"/>
+                <a:ext cx="10753493" cy="4231324"/>
+              </a:xfrm>
+            </p:spPr>
+            <p:txBody>
+              <a:bodyPr>
+                <a:normAutofit fontScale="92500" lnSpcReduction="10000"/>
+              </a:bodyPr>
+              <a:lstStyle/>
+              <a:p>
+                <a:r>
+                  <a:rPr lang="en-US" dirty="0"/>
+                  <a:t>Uses the actual time difference to construct the interpolation formula.</a:t>
+                </a:r>
+              </a:p>
+              <a:p>
+                <a14:m>
+                  <m:oMath xmlns:m="http://schemas.openxmlformats.org/officeDocument/2006/math">
+                    <m:r>
+                      <a:rPr lang="en-US" i="1">
+                        <a:latin typeface="Cambria Math" panose="02040503050406030204" pitchFamily="18" charset="0"/>
+                      </a:rPr>
+                      <m:t>𝑦</m:t>
+                    </m:r>
+                  </m:oMath>
+                </a14:m>
+                <a:r>
+                  <a:rPr lang="en-US" dirty="0">
+                    <a:cs typeface="Arial" panose="020B0604020202020204" pitchFamily="34" charset="0"/>
+                  </a:rPr>
+                  <a:t> is the interpolated value to be substituted for the missing observation at time </a:t>
+                </a:r>
+                <a14:m>
+                  <m:oMath xmlns:m="http://schemas.openxmlformats.org/officeDocument/2006/math">
+                    <m:r>
+                      <a:rPr lang="en-US" b="0" i="1" smtClean="0">
+                        <a:latin typeface="Cambria Math" panose="02040503050406030204" pitchFamily="18" charset="0"/>
+                        <a:cs typeface="Arial" panose="020B0604020202020204" pitchFamily="34" charset="0"/>
+                      </a:rPr>
+                      <m:t>𝑡</m:t>
+                    </m:r>
+                  </m:oMath>
+                </a14:m>
+                <a:endParaRPr lang="en-US" dirty="0">
+                  <a:cs typeface="Arial" panose="020B0604020202020204" pitchFamily="34" charset="0"/>
+                </a:endParaRPr>
+              </a:p>
+              <a:p>
+                <a14:m>
+                  <m:oMath xmlns:m="http://schemas.openxmlformats.org/officeDocument/2006/math">
+                    <m:sSub>
+                      <m:sSubPr>
+                        <m:ctrlPr>
+                          <a:rPr lang="en-US" i="1">
+                            <a:latin typeface="Cambria Math" panose="02040503050406030204" pitchFamily="18" charset="0"/>
+                          </a:rPr>
+                        </m:ctrlPr>
+                      </m:sSubPr>
+                      <m:e>
+                        <m:r>
+                          <a:rPr lang="en-US" i="1">
+                            <a:latin typeface="Cambria Math" panose="02040503050406030204" pitchFamily="18" charset="0"/>
+                          </a:rPr>
+                          <m:t>𝑦</m:t>
+                        </m:r>
+                      </m:e>
+                      <m:sub>
+                        <m:r>
+                          <a:rPr lang="en-US" i="1">
+                            <a:latin typeface="Cambria Math" panose="02040503050406030204" pitchFamily="18" charset="0"/>
+                          </a:rPr>
+                          <m:t>0</m:t>
+                        </m:r>
+                      </m:sub>
+                    </m:sSub>
+                  </m:oMath>
+                </a14:m>
+                <a:r>
+                  <a:rPr lang="en-US" dirty="0">
+                    <a:cs typeface="Arial" panose="020B0604020202020204" pitchFamily="34" charset="0"/>
+                  </a:rPr>
+                  <a:t> and </a:t>
+                </a:r>
+                <a14:m>
+                  <m:oMath xmlns:m="http://schemas.openxmlformats.org/officeDocument/2006/math">
+                    <m:sSub>
+                      <m:sSubPr>
+                        <m:ctrlPr>
+                          <a:rPr lang="en-US" i="1">
+                            <a:latin typeface="Cambria Math" panose="02040503050406030204" pitchFamily="18" charset="0"/>
+                          </a:rPr>
+                        </m:ctrlPr>
+                      </m:sSubPr>
+                      <m:e>
+                        <m:r>
+                          <a:rPr lang="en-US" i="1">
+                            <a:latin typeface="Cambria Math" panose="02040503050406030204" pitchFamily="18" charset="0"/>
+                          </a:rPr>
+                          <m:t>𝑦</m:t>
+                        </m:r>
+                      </m:e>
+                      <m:sub>
+                        <m:r>
+                          <a:rPr lang="en-US" b="0" i="1" smtClean="0">
+                            <a:latin typeface="Cambria Math" panose="02040503050406030204" pitchFamily="18" charset="0"/>
+                          </a:rPr>
+                          <m:t>1</m:t>
+                        </m:r>
+                      </m:sub>
+                    </m:sSub>
+                  </m:oMath>
+                </a14:m>
+                <a:r>
+                  <a:rPr lang="en-US" dirty="0">
+                    <a:cs typeface="Arial" panose="020B0604020202020204" pitchFamily="34" charset="0"/>
+                  </a:rPr>
+                  <a:t> are the known values surrounding the missing data with corresponding time indices </a:t>
+                </a:r>
+                <a14:m>
+                  <m:oMath xmlns:m="http://schemas.openxmlformats.org/officeDocument/2006/math">
+                    <m:sSub>
+                      <m:sSubPr>
+                        <m:ctrlPr>
+                          <a:rPr lang="en-US" i="1">
+                            <a:latin typeface="Cambria Math" panose="02040503050406030204" pitchFamily="18" charset="0"/>
+                          </a:rPr>
+                        </m:ctrlPr>
+                      </m:sSubPr>
+                      <m:e>
+                        <m:r>
+                          <a:rPr lang="en-US" b="0" i="1" smtClean="0">
+                            <a:latin typeface="Cambria Math" panose="02040503050406030204" pitchFamily="18" charset="0"/>
+                          </a:rPr>
+                          <m:t>𝑡</m:t>
+                        </m:r>
+                      </m:e>
+                      <m:sub>
+                        <m:r>
+                          <a:rPr lang="en-US" i="1">
+                            <a:latin typeface="Cambria Math" panose="02040503050406030204" pitchFamily="18" charset="0"/>
+                          </a:rPr>
+                          <m:t>0</m:t>
+                        </m:r>
+                      </m:sub>
+                    </m:sSub>
+                  </m:oMath>
+                </a14:m>
+                <a:r>
+                  <a:rPr lang="en-US" dirty="0">
+                    <a:cs typeface="Arial" panose="020B0604020202020204" pitchFamily="34" charset="0"/>
+                  </a:rPr>
+                  <a:t> and </a:t>
+                </a:r>
+                <a14:m>
+                  <m:oMath xmlns:m="http://schemas.openxmlformats.org/officeDocument/2006/math">
+                    <m:sSub>
+                      <m:sSubPr>
+                        <m:ctrlPr>
+                          <a:rPr lang="en-US" i="1">
+                            <a:latin typeface="Cambria Math" panose="02040503050406030204" pitchFamily="18" charset="0"/>
+                          </a:rPr>
+                        </m:ctrlPr>
+                      </m:sSubPr>
+                      <m:e>
+                        <m:r>
+                          <a:rPr lang="en-US" b="0" i="1" smtClean="0">
+                            <a:latin typeface="Cambria Math" panose="02040503050406030204" pitchFamily="18" charset="0"/>
+                          </a:rPr>
+                          <m:t>𝑡</m:t>
+                        </m:r>
+                      </m:e>
+                      <m:sub>
+                        <m:r>
+                          <a:rPr lang="en-US" b="0" i="1" smtClean="0">
+                            <a:latin typeface="Cambria Math" panose="02040503050406030204" pitchFamily="18" charset="0"/>
+                          </a:rPr>
+                          <m:t>1</m:t>
+                        </m:r>
+                      </m:sub>
+                    </m:sSub>
+                  </m:oMath>
+                </a14:m>
+                <a:endParaRPr lang="en-US" dirty="0">
+                  <a:cs typeface="Arial" panose="020B0604020202020204" pitchFamily="34" charset="0"/>
+                </a:endParaRPr>
+              </a:p>
+              <a:p>
+                <a:endParaRPr lang="en-US" dirty="0">
+                  <a:cs typeface="Arial" panose="020B0604020202020204" pitchFamily="34" charset="0"/>
+                </a:endParaRPr>
+              </a:p>
+              <a:p>
+                <a:endParaRPr lang="en-US" dirty="0">
+                  <a:cs typeface="Arial" panose="020B0604020202020204" pitchFamily="34" charset="0"/>
+                </a:endParaRPr>
+              </a:p>
+              <a:p>
+                <a:r>
+                  <a:rPr lang="en-US" dirty="0">
+                    <a:cs typeface="Arial" panose="020B0604020202020204" pitchFamily="34" charset="0"/>
+                  </a:rPr>
+                  <a:t>The rate of change between the two known points is assumed to be constant in this technique. However the overall rate of change for the time series can vary.</a:t>
+                </a:r>
+              </a:p>
+            </p:txBody>
+          </p:sp>
+        </mc:Choice>
+        <mc:Fallback>
+          <p:sp>
+            <p:nvSpPr>
+              <p:cNvPr id="6" name="Text Placeholder 5">
+                <a:extLst>
+                  <a:ext uri="{FF2B5EF4-FFF2-40B4-BE49-F238E27FC236}">
+                    <a16:creationId xmlns:a16="http://schemas.microsoft.com/office/drawing/2014/main" id="{AB164033-6ED8-171F-DA06-1338A512F996}"/>
+                  </a:ext>
+                </a:extLst>
+              </p:cNvPr>
+              <p:cNvSpPr>
+                <a:spLocks noGrp="1" noRot="1" noChangeAspect="1" noMove="1" noResize="1" noEditPoints="1" noAdjustHandles="1" noChangeArrowheads="1" noChangeShapeType="1" noTextEdit="1"/>
+              </p:cNvSpPr>
+              <p:nvPr>
+                <p:ph type="body" sz="half" idx="2"/>
+              </p:nvPr>
+            </p:nvSpPr>
+            <p:spPr>
+              <a:xfrm>
+                <a:off x="336147" y="1389217"/>
+                <a:ext cx="10753493" cy="4231324"/>
+              </a:xfrm>
+              <a:blipFill>
+                <a:blip r:embed="rId3"/>
+                <a:stretch>
+                  <a:fillRect l="-1061" t="-2994"/>
+                </a:stretch>
+              </a:blipFill>
+            </p:spPr>
+            <p:txBody>
+              <a:bodyPr/>
+              <a:lstStyle/>
+              <a:p>
+                <a:r>
+                  <a:rPr lang="en-US">
+                    <a:noFill/>
+                  </a:rPr>
+                  <a:t> </a:t>
+                </a:r>
+              </a:p>
+            </p:txBody>
+          </p:sp>
+        </mc:Fallback>
+      </mc:AlternateContent>
+      <p:sp>
+        <p:nvSpPr>
+          <p:cNvPr id="2" name="Title 1">
+            <a:extLst>
+              <a:ext uri="{FF2B5EF4-FFF2-40B4-BE49-F238E27FC236}">
+                <a16:creationId xmlns:a16="http://schemas.microsoft.com/office/drawing/2014/main" id="{D44FB4EB-7EA8-7A7E-41AE-9B2A4F29CF4D}"/>
+              </a:ext>
+            </a:extLst>
+          </p:cNvPr>
+          <p:cNvSpPr>
+            <a:spLocks noGrp="1"/>
+          </p:cNvSpPr>
+          <p:nvPr>
+            <p:ph type="title"/>
+          </p:nvPr>
+        </p:nvSpPr>
+        <p:spPr>
+          <a:xfrm>
+            <a:off x="574040" y="0"/>
+            <a:ext cx="10515600" cy="1325563"/>
           </a:xfrm>
         </p:spPr>
         <p:txBody>
@@ -9783,49 +10115,358 @@
           <a:p>
             <a:r>
               <a:rPr lang="en-US" dirty="0"/>
-              <a:t>TEXT</a:t>
-            </a:r>
-            <a:endParaRPr lang="en-US" dirty="0">
-              <a:cs typeface="Arial" panose="020B0604020202020204" pitchFamily="34" charset="0"/>
-            </a:endParaRPr>
-          </a:p>
-        </p:txBody>
-      </p:sp>
-      <p:sp>
-        <p:nvSpPr>
-          <p:cNvPr id="2" name="Title 1">
-            <a:extLst>
-              <a:ext uri="{FF2B5EF4-FFF2-40B4-BE49-F238E27FC236}">
-                <a16:creationId xmlns:a16="http://schemas.microsoft.com/office/drawing/2014/main" id="{D44FB4EB-7EA8-7A7E-41AE-9B2A4F29CF4D}"/>
-              </a:ext>
-            </a:extLst>
-          </p:cNvPr>
-          <p:cNvSpPr>
-            <a:spLocks noGrp="1"/>
-          </p:cNvSpPr>
-          <p:nvPr>
-            <p:ph type="title"/>
-          </p:nvPr>
-        </p:nvSpPr>
-        <p:spPr>
-          <a:xfrm>
-            <a:off x="574040" y="0"/>
-            <a:ext cx="10515600" cy="1325563"/>
-          </a:xfrm>
-        </p:spPr>
-        <p:txBody>
-          <a:bodyPr>
-            <a:normAutofit/>
-          </a:bodyPr>
-          <a:lstStyle/>
-          <a:p>
-            <a:r>
-              <a:rPr lang="en-US" dirty="0"/>
-              <a:t>Time-based interpolation</a:t>
-            </a:r>
-          </a:p>
-        </p:txBody>
-      </p:sp>
+              <a:t>Time-based linear interpolation</a:t>
+            </a:r>
+          </a:p>
+        </p:txBody>
+      </p:sp>
+      <mc:AlternateContent xmlns:mc="http://schemas.openxmlformats.org/markup-compatibility/2006">
+        <mc:Choice xmlns:a14="http://schemas.microsoft.com/office/drawing/2010/main" Requires="a14">
+          <p:sp>
+            <p:nvSpPr>
+              <p:cNvPr id="3" name="TextBox 2">
+                <a:extLst>
+                  <a:ext uri="{FF2B5EF4-FFF2-40B4-BE49-F238E27FC236}">
+                    <a16:creationId xmlns:a16="http://schemas.microsoft.com/office/drawing/2014/main" id="{9CFE1F0D-09C6-8170-9EB6-4E8D43BC0A75}"/>
+                  </a:ext>
+                </a:extLst>
+              </p:cNvPr>
+              <p:cNvSpPr txBox="1"/>
+              <p:nvPr/>
+            </p:nvSpPr>
+            <p:spPr>
+              <a:xfrm>
+                <a:off x="4249663" y="3350418"/>
+                <a:ext cx="2729017" cy="545662"/>
+              </a:xfrm>
+              <a:prstGeom prst="rect">
+                <a:avLst/>
+              </a:prstGeom>
+              <a:noFill/>
+            </p:spPr>
+            <p:txBody>
+              <a:bodyPr wrap="none" lIns="0" tIns="0" rIns="0" bIns="0" rtlCol="0">
+                <a:spAutoFit/>
+              </a:bodyPr>
+              <a:lstStyle/>
+              <a:p>
+                <a14:m>
+                  <m:oMathPara xmlns:m="http://schemas.openxmlformats.org/officeDocument/2006/math">
+                    <m:oMathParaPr>
+                      <m:jc m:val="centerGroup"/>
+                    </m:oMathParaPr>
+                    <m:oMath xmlns:m="http://schemas.openxmlformats.org/officeDocument/2006/math">
+                      <m:r>
+                        <a:rPr lang="en-US" b="0" i="1" smtClean="0">
+                          <a:latin typeface="Cambria Math" panose="02040503050406030204" pitchFamily="18" charset="0"/>
+                        </a:rPr>
+                        <m:t>𝑦</m:t>
+                      </m:r>
+                      <m:r>
+                        <a:rPr lang="en-US" b="0" i="1" smtClean="0">
+                          <a:latin typeface="Cambria Math" panose="02040503050406030204" pitchFamily="18" charset="0"/>
+                        </a:rPr>
+                        <m:t>= </m:t>
+                      </m:r>
+                      <m:sSub>
+                        <m:sSubPr>
+                          <m:ctrlPr>
+                            <a:rPr lang="en-US" b="0" i="1" smtClean="0">
+                              <a:latin typeface="Cambria Math" panose="02040503050406030204" pitchFamily="18" charset="0"/>
+                            </a:rPr>
+                          </m:ctrlPr>
+                        </m:sSubPr>
+                        <m:e>
+                          <m:r>
+                            <a:rPr lang="en-US" b="0" i="1" smtClean="0">
+                              <a:latin typeface="Cambria Math" panose="02040503050406030204" pitchFamily="18" charset="0"/>
+                            </a:rPr>
+                            <m:t>𝑦</m:t>
+                          </m:r>
+                        </m:e>
+                        <m:sub>
+                          <m:r>
+                            <a:rPr lang="en-US" b="0" i="1" smtClean="0">
+                              <a:latin typeface="Cambria Math" panose="02040503050406030204" pitchFamily="18" charset="0"/>
+                            </a:rPr>
+                            <m:t>0</m:t>
+                          </m:r>
+                        </m:sub>
+                      </m:sSub>
+                      <m:r>
+                        <a:rPr lang="en-US" b="0" i="1" smtClean="0">
+                          <a:latin typeface="Cambria Math" panose="02040503050406030204" pitchFamily="18" charset="0"/>
+                        </a:rPr>
+                        <m:t>+(</m:t>
+                      </m:r>
+                      <m:sSub>
+                        <m:sSubPr>
+                          <m:ctrlPr>
+                            <a:rPr lang="en-US" b="0" i="1" smtClean="0">
+                              <a:latin typeface="Cambria Math" panose="02040503050406030204" pitchFamily="18" charset="0"/>
+                            </a:rPr>
+                          </m:ctrlPr>
+                        </m:sSubPr>
+                        <m:e>
+                          <m:r>
+                            <a:rPr lang="en-US" b="0" i="1" smtClean="0">
+                              <a:latin typeface="Cambria Math" panose="02040503050406030204" pitchFamily="18" charset="0"/>
+                            </a:rPr>
+                            <m:t>𝑦</m:t>
+                          </m:r>
+                        </m:e>
+                        <m:sub>
+                          <m:r>
+                            <a:rPr lang="en-US" b="0" i="1" smtClean="0">
+                              <a:latin typeface="Cambria Math" panose="02040503050406030204" pitchFamily="18" charset="0"/>
+                            </a:rPr>
+                            <m:t>1</m:t>
+                          </m:r>
+                        </m:sub>
+                      </m:sSub>
+                      <m:r>
+                        <a:rPr lang="en-US" b="0" i="1" smtClean="0">
+                          <a:latin typeface="Cambria Math" panose="02040503050406030204" pitchFamily="18" charset="0"/>
+                        </a:rPr>
+                        <m:t>−</m:t>
+                      </m:r>
+                      <m:sSub>
+                        <m:sSubPr>
+                          <m:ctrlPr>
+                            <a:rPr lang="en-US" b="0" i="1" smtClean="0">
+                              <a:latin typeface="Cambria Math" panose="02040503050406030204" pitchFamily="18" charset="0"/>
+                            </a:rPr>
+                          </m:ctrlPr>
+                        </m:sSubPr>
+                        <m:e>
+                          <m:r>
+                            <a:rPr lang="en-US" b="0" i="1" smtClean="0">
+                              <a:latin typeface="Cambria Math" panose="02040503050406030204" pitchFamily="18" charset="0"/>
+                            </a:rPr>
+                            <m:t>𝑦</m:t>
+                          </m:r>
+                        </m:e>
+                        <m:sub>
+                          <m:r>
+                            <a:rPr lang="en-US" b="0" i="1" smtClean="0">
+                              <a:latin typeface="Cambria Math" panose="02040503050406030204" pitchFamily="18" charset="0"/>
+                            </a:rPr>
+                            <m:t>0</m:t>
+                          </m:r>
+                        </m:sub>
+                      </m:sSub>
+                      <m:r>
+                        <a:rPr lang="en-US" b="0" i="1" smtClean="0">
+                          <a:latin typeface="Cambria Math" panose="02040503050406030204" pitchFamily="18" charset="0"/>
+                        </a:rPr>
+                        <m:t>)</m:t>
+                      </m:r>
+                      <m:f>
+                        <m:fPr>
+                          <m:ctrlPr>
+                            <a:rPr lang="en-US" b="0" i="1" smtClean="0">
+                              <a:latin typeface="Cambria Math" panose="02040503050406030204" pitchFamily="18" charset="0"/>
+                            </a:rPr>
+                          </m:ctrlPr>
+                        </m:fPr>
+                        <m:num>
+                          <m:r>
+                            <a:rPr lang="en-US" b="0" i="1" smtClean="0">
+                              <a:latin typeface="Cambria Math" panose="02040503050406030204" pitchFamily="18" charset="0"/>
+                            </a:rPr>
+                            <m:t>𝑡</m:t>
+                          </m:r>
+                          <m:r>
+                            <a:rPr lang="en-US" b="0" i="1" smtClean="0">
+                              <a:latin typeface="Cambria Math" panose="02040503050406030204" pitchFamily="18" charset="0"/>
+                            </a:rPr>
+                            <m:t>−</m:t>
+                          </m:r>
+                          <m:sSub>
+                            <m:sSubPr>
+                              <m:ctrlPr>
+                                <a:rPr lang="en-US" b="0" i="1" smtClean="0">
+                                  <a:latin typeface="Cambria Math" panose="02040503050406030204" pitchFamily="18" charset="0"/>
+                                </a:rPr>
+                              </m:ctrlPr>
+                            </m:sSubPr>
+                            <m:e>
+                              <m:r>
+                                <a:rPr lang="en-US" b="0" i="1" smtClean="0">
+                                  <a:latin typeface="Cambria Math" panose="02040503050406030204" pitchFamily="18" charset="0"/>
+                                </a:rPr>
+                                <m:t>𝑡</m:t>
+                              </m:r>
+                            </m:e>
+                            <m:sub>
+                              <m:r>
+                                <a:rPr lang="en-US" b="0" i="1" smtClean="0">
+                                  <a:latin typeface="Cambria Math" panose="02040503050406030204" pitchFamily="18" charset="0"/>
+                                </a:rPr>
+                                <m:t>0</m:t>
+                              </m:r>
+                            </m:sub>
+                          </m:sSub>
+                        </m:num>
+                        <m:den>
+                          <m:sSub>
+                            <m:sSubPr>
+                              <m:ctrlPr>
+                                <a:rPr lang="en-US" b="0" i="1" smtClean="0">
+                                  <a:latin typeface="Cambria Math" panose="02040503050406030204" pitchFamily="18" charset="0"/>
+                                </a:rPr>
+                              </m:ctrlPr>
+                            </m:sSubPr>
+                            <m:e>
+                              <m:r>
+                                <a:rPr lang="en-US" b="0" i="1" smtClean="0">
+                                  <a:latin typeface="Cambria Math" panose="02040503050406030204" pitchFamily="18" charset="0"/>
+                                </a:rPr>
+                                <m:t>𝑡</m:t>
+                              </m:r>
+                            </m:e>
+                            <m:sub>
+                              <m:r>
+                                <a:rPr lang="en-US" b="0" i="1" smtClean="0">
+                                  <a:latin typeface="Cambria Math" panose="02040503050406030204" pitchFamily="18" charset="0"/>
+                                </a:rPr>
+                                <m:t>1</m:t>
+                              </m:r>
+                            </m:sub>
+                          </m:sSub>
+                          <m:r>
+                            <a:rPr lang="en-US" b="0" i="1" smtClean="0">
+                              <a:latin typeface="Cambria Math" panose="02040503050406030204" pitchFamily="18" charset="0"/>
+                            </a:rPr>
+                            <m:t>−</m:t>
+                          </m:r>
+                          <m:sSub>
+                            <m:sSubPr>
+                              <m:ctrlPr>
+                                <a:rPr lang="en-US" b="0" i="1" smtClean="0">
+                                  <a:latin typeface="Cambria Math" panose="02040503050406030204" pitchFamily="18" charset="0"/>
+                                </a:rPr>
+                              </m:ctrlPr>
+                            </m:sSubPr>
+                            <m:e>
+                              <m:r>
+                                <a:rPr lang="en-US" b="0" i="1" smtClean="0">
+                                  <a:latin typeface="Cambria Math" panose="02040503050406030204" pitchFamily="18" charset="0"/>
+                                </a:rPr>
+                                <m:t>𝑡</m:t>
+                              </m:r>
+                            </m:e>
+                            <m:sub>
+                              <m:r>
+                                <a:rPr lang="en-US" b="0" i="1" smtClean="0">
+                                  <a:latin typeface="Cambria Math" panose="02040503050406030204" pitchFamily="18" charset="0"/>
+                                </a:rPr>
+                                <m:t>0</m:t>
+                              </m:r>
+                            </m:sub>
+                          </m:sSub>
+                        </m:den>
+                      </m:f>
+                    </m:oMath>
+                  </m:oMathPara>
+                </a14:m>
+                <a:endParaRPr lang="en-US" dirty="0"/>
+              </a:p>
+            </p:txBody>
+          </p:sp>
+        </mc:Choice>
+        <mc:Fallback>
+          <p:sp>
+            <p:nvSpPr>
+              <p:cNvPr id="3" name="TextBox 2">
+                <a:extLst>
+                  <a:ext uri="{FF2B5EF4-FFF2-40B4-BE49-F238E27FC236}">
+                    <a16:creationId xmlns:a16="http://schemas.microsoft.com/office/drawing/2014/main" id="{9CFE1F0D-09C6-8170-9EB6-4E8D43BC0A75}"/>
+                  </a:ext>
+                </a:extLst>
+              </p:cNvPr>
+              <p:cNvSpPr txBox="1">
+                <a:spLocks noRot="1" noChangeAspect="1" noMove="1" noResize="1" noEditPoints="1" noAdjustHandles="1" noChangeArrowheads="1" noChangeShapeType="1" noTextEdit="1"/>
+              </p:cNvSpPr>
+              <p:nvPr/>
+            </p:nvSpPr>
+            <p:spPr>
+              <a:xfrm>
+                <a:off x="4249663" y="3350418"/>
+                <a:ext cx="2729017" cy="545662"/>
+              </a:xfrm>
+              <a:prstGeom prst="rect">
+                <a:avLst/>
+              </a:prstGeom>
+              <a:blipFill>
+                <a:blip r:embed="rId4"/>
+                <a:stretch>
+                  <a:fillRect l="-463" t="-2326" b="-9302"/>
+                </a:stretch>
+              </a:blipFill>
+            </p:spPr>
+            <p:txBody>
+              <a:bodyPr/>
+              <a:lstStyle/>
+              <a:p>
+                <a:r>
+                  <a:rPr lang="en-US">
+                    <a:noFill/>
+                  </a:rPr>
+                  <a:t> </a:t>
+                </a:r>
+              </a:p>
+            </p:txBody>
+          </p:sp>
+        </mc:Fallback>
+      </mc:AlternateContent>
+      <p:pic>
+        <p:nvPicPr>
+          <p:cNvPr id="1026" name="Picture 2" descr="Linear interpolation - Wikipedia">
+            <a:extLst>
+              <a:ext uri="{FF2B5EF4-FFF2-40B4-BE49-F238E27FC236}">
+                <a16:creationId xmlns:a16="http://schemas.microsoft.com/office/drawing/2014/main" id="{4FC85AD4-A207-55BC-B59B-A9BDFC09EB6B}"/>
+              </a:ext>
+            </a:extLst>
+          </p:cNvPr>
+          <p:cNvPicPr>
+            <a:picLocks noChangeAspect="1" noChangeArrowheads="1"/>
+          </p:cNvPicPr>
+          <p:nvPr/>
+        </p:nvPicPr>
+        <p:blipFill>
+          <a:blip r:embed="rId5">
+            <a:extLst>
+              <a:ext uri="{28A0092B-C50C-407E-A947-70E740481C1C}">
+                <a14:useLocalDpi xmlns:a14="http://schemas.microsoft.com/office/drawing/2010/main" val="0"/>
+              </a:ext>
+            </a:extLst>
+          </a:blip>
+          <a:srcRect/>
+          <a:stretch>
+            <a:fillRect/>
+          </a:stretch>
+        </p:blipFill>
+        <p:spPr bwMode="auto">
+          <a:xfrm>
+            <a:off x="9743439" y="2204878"/>
+            <a:ext cx="2112729" cy="2112729"/>
+          </a:xfrm>
+          <a:prstGeom prst="rect">
+            <a:avLst/>
+          </a:prstGeom>
+          <a:noFill/>
+          <a:extLst>
+            <a:ext uri="{909E8E84-426E-40DD-AFC4-6F175D3DCCD1}">
+              <a14:hiddenFill xmlns:a14="http://schemas.microsoft.com/office/drawing/2010/main">
+                <a:solidFill>
+                  <a:srgbClr val="FFFFFF"/>
+                </a:solidFill>
+              </a14:hiddenFill>
+            </a:ext>
+          </a:extLst>
+        </p:spPr>
+      </p:pic>
     </p:spTree>
     <p:extLst>
       <p:ext uri="{BB962C8B-B14F-4D97-AF65-F5344CB8AC3E}">
@@ -10623,12 +11264,6 @@
 </file>
 
 <file path=customXml/item1.xml><?xml version="1.0" encoding="utf-8"?>
-<p:properties xmlns:p="http://schemas.microsoft.com/office/2006/metadata/properties" xmlns:xsi="http://www.w3.org/2001/XMLSchema-instance" xmlns:pc="http://schemas.microsoft.com/office/infopath/2007/PartnerControls">
-  <documentManagement/>
-</p:properties>
-</file>
-
-<file path=customXml/item2.xml><?xml version="1.0" encoding="utf-8"?>
 <ct:contentTypeSchema xmlns:ct="http://schemas.microsoft.com/office/2006/metadata/contentType" xmlns:ma="http://schemas.microsoft.com/office/2006/metadata/properties/metaAttributes" ct:_="" ma:_="" ma:contentTypeName="Document" ma:contentTypeID="0x0101007B36DDC62D2E614B8349009FA2B533FE" ma:contentTypeVersion="4" ma:contentTypeDescription="Create a new document." ma:contentTypeScope="" ma:versionID="18725572ae5737337d1ea29df23a8a8f">
   <xsd:schema xmlns:xsd="http://www.w3.org/2001/XMLSchema" xmlns:xs="http://www.w3.org/2001/XMLSchema" xmlns:p="http://schemas.microsoft.com/office/2006/metadata/properties" xmlns:ns2="e2356c7f-9a1b-41db-8d89-51bb5d8463d9" xmlns:ns3="01fcfbda-9643-476e-88fb-ce7a1280f67e" targetNamespace="http://schemas.microsoft.com/office/2006/metadata/properties" ma:root="true" ma:fieldsID="b7bb254471d871a85256d5242377c131" ns2:_="" ns3:_="">
     <xsd:import namespace="e2356c7f-9a1b-41db-8d89-51bb5d8463d9"/>
@@ -10793,6 +11428,12 @@
 </ct:contentTypeSchema>
 </file>
 
+<file path=customXml/item2.xml><?xml version="1.0" encoding="utf-8"?>
+<p:properties xmlns:p="http://schemas.microsoft.com/office/2006/metadata/properties" xmlns:xsi="http://www.w3.org/2001/XMLSchema-instance" xmlns:pc="http://schemas.microsoft.com/office/infopath/2007/PartnerControls">
+  <documentManagement/>
+</p:properties>
+</file>
+
 <file path=customXml/item3.xml><?xml version="1.0" encoding="utf-8"?>
 <?mso-contentType ?>
 <FormTemplates xmlns="http://schemas.microsoft.com/sharepoint/v3/contenttype/forms">
@@ -10803,23 +11444,6 @@
 </file>
 
 <file path=customXml/itemProps1.xml><?xml version="1.0" encoding="utf-8"?>
-<ds:datastoreItem xmlns:ds="http://schemas.openxmlformats.org/officeDocument/2006/customXml" ds:itemID="{A300138A-D0B6-4BD3-A39F-6BE448948C56}">
-  <ds:schemaRefs>
-    <ds:schemaRef ds:uri="http://purl.org/dc/dcmitype/"/>
-    <ds:schemaRef ds:uri="http://schemas.microsoft.com/office/2006/documentManagement/types"/>
-    <ds:schemaRef ds:uri="http://purl.org/dc/elements/1.1/"/>
-    <ds:schemaRef ds:uri="http://purl.org/dc/terms/"/>
-    <ds:schemaRef ds:uri="http://schemas.microsoft.com/office/2006/metadata/properties"/>
-    <ds:schemaRef ds:uri="http://schemas.microsoft.com/office/infopath/2007/PartnerControls"/>
-    <ds:schemaRef ds:uri="http://www.w3.org/XML/1998/namespace"/>
-    <ds:schemaRef ds:uri="01fcfbda-9643-476e-88fb-ce7a1280f67e"/>
-    <ds:schemaRef ds:uri="http://schemas.openxmlformats.org/package/2006/metadata/core-properties"/>
-    <ds:schemaRef ds:uri="e2356c7f-9a1b-41db-8d89-51bb5d8463d9"/>
-  </ds:schemaRefs>
-</ds:datastoreItem>
-</file>
-
-<file path=customXml/itemProps2.xml><?xml version="1.0" encoding="utf-8"?>
 <ds:datastoreItem xmlns:ds="http://schemas.openxmlformats.org/officeDocument/2006/customXml" ds:itemID="{2153DE5F-7153-4DC3-AEDE-BDC2BC789C84}">
   <ds:schemaRefs>
     <ds:schemaRef ds:uri="http://schemas.microsoft.com/office/2006/metadata/contentType"/>
@@ -10838,6 +11462,23 @@
 </ds:datastoreItem>
 </file>
 
+<file path=customXml/itemProps2.xml><?xml version="1.0" encoding="utf-8"?>
+<ds:datastoreItem xmlns:ds="http://schemas.openxmlformats.org/officeDocument/2006/customXml" ds:itemID="{A300138A-D0B6-4BD3-A39F-6BE448948C56}">
+  <ds:schemaRefs>
+    <ds:schemaRef ds:uri="http://purl.org/dc/dcmitype/"/>
+    <ds:schemaRef ds:uri="http://schemas.microsoft.com/office/2006/documentManagement/types"/>
+    <ds:schemaRef ds:uri="http://purl.org/dc/elements/1.1/"/>
+    <ds:schemaRef ds:uri="http://purl.org/dc/terms/"/>
+    <ds:schemaRef ds:uri="http://schemas.microsoft.com/office/2006/metadata/properties"/>
+    <ds:schemaRef ds:uri="http://schemas.microsoft.com/office/infopath/2007/PartnerControls"/>
+    <ds:schemaRef ds:uri="http://www.w3.org/XML/1998/namespace"/>
+    <ds:schemaRef ds:uri="01fcfbda-9643-476e-88fb-ce7a1280f67e"/>
+    <ds:schemaRef ds:uri="http://schemas.openxmlformats.org/package/2006/metadata/core-properties"/>
+    <ds:schemaRef ds:uri="e2356c7f-9a1b-41db-8d89-51bb5d8463d9"/>
+  </ds:schemaRefs>
+</ds:datastoreItem>
+</file>
+
 <file path=customXml/itemProps3.xml><?xml version="1.0" encoding="utf-8"?>
 <ds:datastoreItem xmlns:ds="http://schemas.openxmlformats.org/officeDocument/2006/customXml" ds:itemID="{9F4A7EDE-2846-4720-9905-EF57A5C0C3A6}">
   <ds:schemaRefs>

</xml_diff>